<commit_message>
modified:   XeonPhiTalk.pptx 	spelling fixes
</commit_message>
<xml_diff>
--- a/XeonPhiTalk.pptx
+++ b/XeonPhiTalk.pptx
@@ -207,7 +207,7 @@
           <a:p>
             <a:fld id="{09B8CEEC-792C-47E0-BF4E-B7DC2E20BED7}" type="datetimeFigureOut">
               <a:rPr lang="en-US"/>
-              <a:t>1/21/2017</a:t>
+              <a:t>1/22/2017</a:t>
             </a:fld>
             <a:endParaRPr lang="en-US"/>
           </a:p>
@@ -1500,7 +1500,7 @@
           <a:p>
             <a:fld id="{4AAD347D-5ACD-4C99-B74B-A9C85AD731AF}" type="datetimeFigureOut">
               <a:rPr lang="en-US" dirty="0"/>
-              <a:t>1/21/2017</a:t>
+              <a:t>1/22/2017</a:t>
             </a:fld>
             <a:endParaRPr lang="en-US" dirty="0"/>
           </a:p>
@@ -1770,7 +1770,7 @@
           <a:p>
             <a:fld id="{4509A250-FF31-4206-8172-F9D3106AACB1}" type="datetimeFigureOut">
               <a:rPr lang="en-US" dirty="0"/>
-              <a:t>1/21/2017</a:t>
+              <a:t>1/22/2017</a:t>
             </a:fld>
             <a:endParaRPr lang="en-US" dirty="0"/>
           </a:p>
@@ -1959,7 +1959,7 @@
           <a:p>
             <a:fld id="{4509A250-FF31-4206-8172-F9D3106AACB1}" type="datetimeFigureOut">
               <a:rPr lang="en-US" dirty="0"/>
-              <a:t>1/21/2017</a:t>
+              <a:t>1/22/2017</a:t>
             </a:fld>
             <a:endParaRPr lang="en-US" dirty="0"/>
           </a:p>
@@ -2227,7 +2227,7 @@
           <a:p>
             <a:fld id="{4509A250-FF31-4206-8172-F9D3106AACB1}" type="datetimeFigureOut">
               <a:rPr lang="en-US" dirty="0"/>
-              <a:t>1/21/2017</a:t>
+              <a:t>1/22/2017</a:t>
             </a:fld>
             <a:endParaRPr lang="en-US" dirty="0"/>
           </a:p>
@@ -2563,7 +2563,7 @@
           <a:p>
             <a:fld id="{4509A250-FF31-4206-8172-F9D3106AACB1}" type="datetimeFigureOut">
               <a:rPr lang="en-US" dirty="0"/>
-              <a:t>1/21/2017</a:t>
+              <a:t>1/22/2017</a:t>
             </a:fld>
             <a:endParaRPr lang="en-US" dirty="0"/>
           </a:p>
@@ -3181,7 +3181,7 @@
           <a:p>
             <a:fld id="{4509A250-FF31-4206-8172-F9D3106AACB1}" type="datetimeFigureOut">
               <a:rPr lang="en-US" dirty="0"/>
-              <a:t>1/21/2017</a:t>
+              <a:t>1/22/2017</a:t>
             </a:fld>
             <a:endParaRPr lang="en-US" dirty="0"/>
           </a:p>
@@ -4036,7 +4036,7 @@
           <a:p>
             <a:fld id="{4509A250-FF31-4206-8172-F9D3106AACB1}" type="datetimeFigureOut">
               <a:rPr lang="en-US" dirty="0"/>
-              <a:t>1/21/2017</a:t>
+              <a:t>1/22/2017</a:t>
             </a:fld>
             <a:endParaRPr lang="en-US" dirty="0"/>
           </a:p>
@@ -4201,7 +4201,7 @@
           <a:p>
             <a:fld id="{4509A250-FF31-4206-8172-F9D3106AACB1}" type="datetimeFigureOut">
               <a:rPr lang="en-US" dirty="0"/>
-              <a:t>1/21/2017</a:t>
+              <a:t>1/22/2017</a:t>
             </a:fld>
             <a:endParaRPr lang="en-US" dirty="0"/>
           </a:p>
@@ -4376,7 +4376,7 @@
           <a:p>
             <a:fld id="{4509A250-FF31-4206-8172-F9D3106AACB1}" type="datetimeFigureOut">
               <a:rPr lang="en-US" dirty="0"/>
-              <a:t>1/21/2017</a:t>
+              <a:t>1/22/2017</a:t>
             </a:fld>
             <a:endParaRPr lang="en-US" dirty="0"/>
           </a:p>
@@ -4541,7 +4541,7 @@
           <a:p>
             <a:fld id="{4509A250-FF31-4206-8172-F9D3106AACB1}" type="datetimeFigureOut">
               <a:rPr lang="en-US" dirty="0"/>
-              <a:t>1/21/2017</a:t>
+              <a:t>1/22/2017</a:t>
             </a:fld>
             <a:endParaRPr lang="en-US" dirty="0"/>
           </a:p>
@@ -4783,7 +4783,7 @@
           <a:p>
             <a:fld id="{9796027F-7875-4030-9381-8BD8C4F21935}" type="datetimeFigureOut">
               <a:rPr lang="en-US" dirty="0"/>
-              <a:t>1/21/2017</a:t>
+              <a:t>1/22/2017</a:t>
             </a:fld>
             <a:endParaRPr lang="en-US" dirty="0"/>
           </a:p>
@@ -5070,7 +5070,7 @@
           <a:p>
             <a:fld id="{9796027F-7875-4030-9381-8BD8C4F21935}" type="datetimeFigureOut">
               <a:rPr lang="en-US" dirty="0"/>
-              <a:t>1/21/2017</a:t>
+              <a:t>1/22/2017</a:t>
             </a:fld>
             <a:endParaRPr lang="en-US" dirty="0"/>
           </a:p>
@@ -5509,7 +5509,7 @@
           <a:p>
             <a:fld id="{9796027F-7875-4030-9381-8BD8C4F21935}" type="datetimeFigureOut">
               <a:rPr lang="en-US" dirty="0"/>
-              <a:t>1/21/2017</a:t>
+              <a:t>1/22/2017</a:t>
             </a:fld>
             <a:endParaRPr lang="en-US" dirty="0"/>
           </a:p>
@@ -5622,7 +5622,7 @@
           <a:p>
             <a:fld id="{4509A250-FF31-4206-8172-F9D3106AACB1}" type="datetimeFigureOut">
               <a:rPr lang="en-US" dirty="0"/>
-              <a:t>1/21/2017</a:t>
+              <a:t>1/22/2017</a:t>
             </a:fld>
             <a:endParaRPr lang="en-US" dirty="0"/>
           </a:p>
@@ -5712,7 +5712,7 @@
           <a:p>
             <a:fld id="{4509A250-FF31-4206-8172-F9D3106AACB1}" type="datetimeFigureOut">
               <a:rPr lang="en-US" dirty="0"/>
-              <a:t>1/21/2017</a:t>
+              <a:t>1/22/2017</a:t>
             </a:fld>
             <a:endParaRPr lang="en-US" dirty="0"/>
           </a:p>
@@ -5986,7 +5986,7 @@
           <a:p>
             <a:fld id="{4509A250-FF31-4206-8172-F9D3106AACB1}" type="datetimeFigureOut">
               <a:rPr lang="en-US" dirty="0"/>
-              <a:t>1/21/2017</a:t>
+              <a:t>1/22/2017</a:t>
             </a:fld>
             <a:endParaRPr lang="en-US" dirty="0"/>
           </a:p>
@@ -6256,7 +6256,7 @@
           <a:p>
             <a:fld id="{4509A250-FF31-4206-8172-F9D3106AACB1}" type="datetimeFigureOut">
               <a:rPr lang="en-US" dirty="0"/>
-              <a:t>1/21/2017</a:t>
+              <a:t>1/22/2017</a:t>
             </a:fld>
             <a:endParaRPr lang="en-US" dirty="0"/>
           </a:p>
@@ -6680,7 +6680,7 @@
           <a:p>
             <a:fld id="{4AAD347D-5ACD-4C99-B74B-A9C85AD731AF}" type="datetimeFigureOut">
               <a:rPr lang="en-US" dirty="0"/>
-              <a:t>1/21/2017</a:t>
+              <a:t>1/22/2017</a:t>
             </a:fld>
             <a:endParaRPr lang="en-US" dirty="0"/>
           </a:p>
@@ -8801,37 +8801,13 @@
           <a:p>
             <a:r>
               <a:rPr lang="EN-US" dirty="0"/>
-              <a:t>System shared among a number of different projects (torque </a:t>
-            </a:r>
-            <a:r>
-              <a:rPr lang="EN-US" dirty="0" err="1"/>
-              <a:t>pbs</a:t>
-            </a:r>
+              <a:t>System shared among a number of different projects (torque PBS and Maui scheduler manages)</a:t>
+            </a:r>
+          </a:p>
+          <a:p>
             <a:r>
               <a:rPr lang="EN-US" dirty="0"/>
-              <a:t> and </a:t>
-            </a:r>
-            <a:r>
-              <a:rPr lang="EN-US" dirty="0" err="1"/>
-              <a:t>maui</a:t>
-            </a:r>
-            <a:r>
-              <a:rPr lang="EN-US" dirty="0"/>
-              <a:t> scheduler manages)</a:t>
-            </a:r>
-          </a:p>
-          <a:p>
-            <a:r>
-              <a:rPr lang="EN-US" dirty="0"/>
-              <a:t>Users have access to a compiler </a:t>
-            </a:r>
-            <a:r>
-              <a:rPr lang="EN-US" dirty="0" err="1"/>
-              <a:t>suit</a:t>
-            </a:r>
-            <a:r>
-              <a:rPr lang="EN-US" dirty="0"/>
-              <a:t> from Intel with advanced debugging and optimization tools</a:t>
+              <a:t>Users have access to a compiler suite from Intel with advanced debugging and optimization tools</a:t>
             </a:r>
           </a:p>
           <a:p>

</xml_diff>